<commit_message>
update dia 2: logo UAH mejora imagen resumen_funciones
</commit_message>
<xml_diff>
--- a/images/resumen_funciones.pptx
+++ b/images/resumen_funciones.pptx
@@ -118,7 +118,7 @@
 <file path=ppt/revisionInfo.xml><?xml version="1.0" encoding="utf-8"?>
 <p1510:revInfo xmlns:a="http://schemas.openxmlformats.org/drawingml/2006/main" xmlns:r="http://schemas.openxmlformats.org/officeDocument/2006/relationships" xmlns:p1510="http://schemas.microsoft.com/office/powerpoint/2015/10/main">
   <p1510:revLst>
-    <p1510:client id="{A1601648-0797-4B8B-A526-7CBE96C03E56}" v="4" dt="2026-01-11T18:16:38.876"/>
+    <p1510:client id="{A1601648-0797-4B8B-A526-7CBE96C03E56}" v="41" dt="2026-01-12T07:29:13.828"/>
   </p1510:revLst>
 </p1510:revInfo>
 </file>
@@ -128,7 +128,7 @@
   <pc:docChgLst>
     <pc:chgData name="Rodes Blanco Marina" userId="504ae263-8a08-4aa2-8850-a56660022c36" providerId="ADAL" clId="{E80D64F7-B34B-465F-90A1-9D85E0DAAB7A}"/>
     <pc:docChg chg="undo custSel modSld modMainMaster">
-      <pc:chgData name="Rodes Blanco Marina" userId="504ae263-8a08-4aa2-8850-a56660022c36" providerId="ADAL" clId="{E80D64F7-B34B-465F-90A1-9D85E0DAAB7A}" dt="2026-01-11T18:16:54.876" v="93" actId="1036"/>
+      <pc:chgData name="Rodes Blanco Marina" userId="504ae263-8a08-4aa2-8850-a56660022c36" providerId="ADAL" clId="{E80D64F7-B34B-465F-90A1-9D85E0DAAB7A}" dt="2026-01-12T07:29:13.826" v="151" actId="12789"/>
       <pc:docMkLst>
         <pc:docMk/>
       </pc:docMkLst>
@@ -225,14 +225,14 @@
           </ac:picMkLst>
         </pc:picChg>
       </pc:sldChg>
-      <pc:sldChg chg="modSp mod">
-        <pc:chgData name="Rodes Blanco Marina" userId="504ae263-8a08-4aa2-8850-a56660022c36" providerId="ADAL" clId="{E80D64F7-B34B-465F-90A1-9D85E0DAAB7A}" dt="2026-01-11T18:16:54.876" v="93" actId="1036"/>
+      <pc:sldChg chg="addSp delSp modSp mod">
+        <pc:chgData name="Rodes Blanco Marina" userId="504ae263-8a08-4aa2-8850-a56660022c36" providerId="ADAL" clId="{E80D64F7-B34B-465F-90A1-9D85E0DAAB7A}" dt="2026-01-12T07:29:13.826" v="151" actId="12789"/>
         <pc:sldMkLst>
           <pc:docMk/>
           <pc:sldMk cId="3469232705" sldId="259"/>
         </pc:sldMkLst>
-        <pc:graphicFrameChg chg="modGraphic">
-          <ac:chgData name="Rodes Blanco Marina" userId="504ae263-8a08-4aa2-8850-a56660022c36" providerId="ADAL" clId="{E80D64F7-B34B-465F-90A1-9D85E0DAAB7A}" dt="2026-01-11T18:16:47.906" v="76" actId="20577"/>
+        <pc:graphicFrameChg chg="mod modGraphic">
+          <ac:chgData name="Rodes Blanco Marina" userId="504ae263-8a08-4aa2-8850-a56660022c36" providerId="ADAL" clId="{E80D64F7-B34B-465F-90A1-9D85E0DAAB7A}" dt="2026-01-12T07:26:39.831" v="123"/>
           <ac:graphicFrameMkLst>
             <pc:docMk/>
             <pc:sldMk cId="3469232705" sldId="259"/>
@@ -245,6 +245,22 @@
             <pc:docMk/>
             <pc:sldMk cId="3469232705" sldId="259"/>
             <ac:picMk id="3" creationId="{D9D90515-D561-E08C-7F12-EA274E329081}"/>
+          </ac:picMkLst>
+        </pc:picChg>
+        <pc:picChg chg="mod">
+          <ac:chgData name="Rodes Blanco Marina" userId="504ae263-8a08-4aa2-8850-a56660022c36" providerId="ADAL" clId="{E80D64F7-B34B-465F-90A1-9D85E0DAAB7A}" dt="2026-01-12T07:25:06.682" v="104" actId="1035"/>
+          <ac:picMkLst>
+            <pc:docMk/>
+            <pc:sldMk cId="3469232705" sldId="259"/>
+            <ac:picMk id="5" creationId="{81870882-F5CF-C311-03F1-9E539F7027DB}"/>
+          </ac:picMkLst>
+        </pc:picChg>
+        <pc:picChg chg="add del mod">
+          <ac:chgData name="Rodes Blanco Marina" userId="504ae263-8a08-4aa2-8850-a56660022c36" providerId="ADAL" clId="{E80D64F7-B34B-465F-90A1-9D85E0DAAB7A}" dt="2026-01-12T07:25:53.398" v="115" actId="478"/>
+          <ac:picMkLst>
+            <pc:docMk/>
+            <pc:sldMk cId="3469232705" sldId="259"/>
+            <ac:picMk id="6" creationId="{D4107E61-BD0C-9CD0-A012-34F591E6CB59}"/>
           </ac:picMkLst>
         </pc:picChg>
         <pc:picChg chg="mod">
@@ -261,6 +277,14 @@
             <pc:docMk/>
             <pc:sldMk cId="3469232705" sldId="259"/>
             <ac:picMk id="9" creationId="{ABDEA536-FDD0-0AE1-4645-BB5D2A9B5C04}"/>
+          </ac:picMkLst>
+        </pc:picChg>
+        <pc:picChg chg="mod">
+          <ac:chgData name="Rodes Blanco Marina" userId="504ae263-8a08-4aa2-8850-a56660022c36" providerId="ADAL" clId="{E80D64F7-B34B-465F-90A1-9D85E0DAAB7A}" dt="2026-01-12T07:25:09.610" v="110" actId="1035"/>
+          <ac:picMkLst>
+            <pc:docMk/>
+            <pc:sldMk cId="3469232705" sldId="259"/>
+            <ac:picMk id="10" creationId="{DB8B82BA-35B8-23B4-6E93-01A4A69FF846}"/>
           </ac:picMkLst>
         </pc:picChg>
         <pc:picChg chg="mod">
@@ -333,6 +357,38 @@
             <pc:docMk/>
             <pc:sldMk cId="3469232705" sldId="259"/>
             <ac:picMk id="24" creationId="{695DC193-06A0-5191-2CA4-375E5455A893}"/>
+          </ac:picMkLst>
+        </pc:picChg>
+        <pc:picChg chg="add mod">
+          <ac:chgData name="Rodes Blanco Marina" userId="504ae263-8a08-4aa2-8850-a56660022c36" providerId="ADAL" clId="{E80D64F7-B34B-465F-90A1-9D85E0DAAB7A}" dt="2026-01-12T07:29:13.826" v="151" actId="12789"/>
+          <ac:picMkLst>
+            <pc:docMk/>
+            <pc:sldMk cId="3469232705" sldId="259"/>
+            <ac:picMk id="1026" creationId="{7A7BC1B0-E84F-A8A1-76ED-65AC9734F75C}"/>
+          </ac:picMkLst>
+        </pc:picChg>
+        <pc:picChg chg="add del mod">
+          <ac:chgData name="Rodes Blanco Marina" userId="504ae263-8a08-4aa2-8850-a56660022c36" providerId="ADAL" clId="{E80D64F7-B34B-465F-90A1-9D85E0DAAB7A}" dt="2026-01-12T07:27:23.169" v="128" actId="478"/>
+          <ac:picMkLst>
+            <pc:docMk/>
+            <pc:sldMk cId="3469232705" sldId="259"/>
+            <ac:picMk id="1028" creationId="{BCB429B7-2A38-4D08-A706-C3E0DB2F8267}"/>
+          </ac:picMkLst>
+        </pc:picChg>
+        <pc:picChg chg="add mod">
+          <ac:chgData name="Rodes Blanco Marina" userId="504ae263-8a08-4aa2-8850-a56660022c36" providerId="ADAL" clId="{E80D64F7-B34B-465F-90A1-9D85E0DAAB7A}" dt="2026-01-12T07:29:13.826" v="151" actId="12789"/>
+          <ac:picMkLst>
+            <pc:docMk/>
+            <pc:sldMk cId="3469232705" sldId="259"/>
+            <ac:picMk id="1030" creationId="{F2E5D693-D79B-445E-11A6-500DB6EAE438}"/>
+          </ac:picMkLst>
+        </pc:picChg>
+        <pc:picChg chg="add mod">
+          <ac:chgData name="Rodes Blanco Marina" userId="504ae263-8a08-4aa2-8850-a56660022c36" providerId="ADAL" clId="{E80D64F7-B34B-465F-90A1-9D85E0DAAB7A}" dt="2026-01-12T07:29:13.826" v="151" actId="12789"/>
+          <ac:picMkLst>
+            <pc:docMk/>
+            <pc:sldMk cId="3469232705" sldId="259"/>
+            <ac:picMk id="1032" creationId="{7DA8407C-5666-E961-23F5-EC260F979EFF}"/>
           </ac:picMkLst>
         </pc:picChg>
       </pc:sldChg>
@@ -746,7 +802,7 @@
           <a:p>
             <a:fld id="{B0CEFBE8-179B-43F5-8399-C44CC5E4E049}" type="datetimeFigureOut">
               <a:rPr lang="es-ES" smtClean="0"/>
-              <a:t>11/01/2026</a:t>
+              <a:t>12/01/2026</a:t>
             </a:fld>
             <a:endParaRPr lang="es-ES" dirty="0"/>
           </a:p>
@@ -916,7 +972,7 @@
           <a:p>
             <a:fld id="{B0CEFBE8-179B-43F5-8399-C44CC5E4E049}" type="datetimeFigureOut">
               <a:rPr lang="es-ES" smtClean="0"/>
-              <a:t>11/01/2026</a:t>
+              <a:t>12/01/2026</a:t>
             </a:fld>
             <a:endParaRPr lang="es-ES" dirty="0"/>
           </a:p>
@@ -1096,7 +1152,7 @@
           <a:p>
             <a:fld id="{B0CEFBE8-179B-43F5-8399-C44CC5E4E049}" type="datetimeFigureOut">
               <a:rPr lang="es-ES" smtClean="0"/>
-              <a:t>11/01/2026</a:t>
+              <a:t>12/01/2026</a:t>
             </a:fld>
             <a:endParaRPr lang="es-ES" dirty="0"/>
           </a:p>
@@ -1266,7 +1322,7 @@
           <a:p>
             <a:fld id="{B0CEFBE8-179B-43F5-8399-C44CC5E4E049}" type="datetimeFigureOut">
               <a:rPr lang="es-ES" smtClean="0"/>
-              <a:t>11/01/2026</a:t>
+              <a:t>12/01/2026</a:t>
             </a:fld>
             <a:endParaRPr lang="es-ES" dirty="0"/>
           </a:p>
@@ -1512,7 +1568,7 @@
           <a:p>
             <a:fld id="{B0CEFBE8-179B-43F5-8399-C44CC5E4E049}" type="datetimeFigureOut">
               <a:rPr lang="es-ES" smtClean="0"/>
-              <a:t>11/01/2026</a:t>
+              <a:t>12/01/2026</a:t>
             </a:fld>
             <a:endParaRPr lang="es-ES" dirty="0"/>
           </a:p>
@@ -1744,7 +1800,7 @@
           <a:p>
             <a:fld id="{B0CEFBE8-179B-43F5-8399-C44CC5E4E049}" type="datetimeFigureOut">
               <a:rPr lang="es-ES" smtClean="0"/>
-              <a:t>11/01/2026</a:t>
+              <a:t>12/01/2026</a:t>
             </a:fld>
             <a:endParaRPr lang="es-ES" dirty="0"/>
           </a:p>
@@ -2111,7 +2167,7 @@
           <a:p>
             <a:fld id="{B0CEFBE8-179B-43F5-8399-C44CC5E4E049}" type="datetimeFigureOut">
               <a:rPr lang="es-ES" smtClean="0"/>
-              <a:t>11/01/2026</a:t>
+              <a:t>12/01/2026</a:t>
             </a:fld>
             <a:endParaRPr lang="es-ES" dirty="0"/>
           </a:p>
@@ -2229,7 +2285,7 @@
           <a:p>
             <a:fld id="{B0CEFBE8-179B-43F5-8399-C44CC5E4E049}" type="datetimeFigureOut">
               <a:rPr lang="es-ES" smtClean="0"/>
-              <a:t>11/01/2026</a:t>
+              <a:t>12/01/2026</a:t>
             </a:fld>
             <a:endParaRPr lang="es-ES" dirty="0"/>
           </a:p>
@@ -2324,7 +2380,7 @@
           <a:p>
             <a:fld id="{B0CEFBE8-179B-43F5-8399-C44CC5E4E049}" type="datetimeFigureOut">
               <a:rPr lang="es-ES" smtClean="0"/>
-              <a:t>11/01/2026</a:t>
+              <a:t>12/01/2026</a:t>
             </a:fld>
             <a:endParaRPr lang="es-ES" dirty="0"/>
           </a:p>
@@ -2601,7 +2657,7 @@
           <a:p>
             <a:fld id="{B0CEFBE8-179B-43F5-8399-C44CC5E4E049}" type="datetimeFigureOut">
               <a:rPr lang="es-ES" smtClean="0"/>
-              <a:t>11/01/2026</a:t>
+              <a:t>12/01/2026</a:t>
             </a:fld>
             <a:endParaRPr lang="es-ES" dirty="0"/>
           </a:p>
@@ -2858,7 +2914,7 @@
           <a:p>
             <a:fld id="{B0CEFBE8-179B-43F5-8399-C44CC5E4E049}" type="datetimeFigureOut">
               <a:rPr lang="es-ES" smtClean="0"/>
-              <a:t>11/01/2026</a:t>
+              <a:t>12/01/2026</a:t>
             </a:fld>
             <a:endParaRPr lang="es-ES" dirty="0"/>
           </a:p>
@@ -3071,7 +3127,7 @@
           <a:p>
             <a:fld id="{B0CEFBE8-179B-43F5-8399-C44CC5E4E049}" type="datetimeFigureOut">
               <a:rPr lang="es-ES" smtClean="0"/>
-              <a:t>11/01/2026</a:t>
+              <a:t>12/01/2026</a:t>
             </a:fld>
             <a:endParaRPr lang="es-ES" dirty="0"/>
           </a:p>
@@ -3578,7 +3634,7 @@
         </p:nvGraphicFramePr>
         <p:xfrm>
           <a:off x="1143001" y="3429000"/>
-          <a:ext cx="4572000" cy="2528894"/>
+          <a:ext cx="4572000" cy="2537356"/>
         </p:xfrm>
         <a:graphic>
           <a:graphicData uri="http://schemas.openxmlformats.org/drawingml/2006/table">
@@ -4193,7 +4249,7 @@
         </p:nvGraphicFramePr>
         <p:xfrm>
           <a:off x="1143001" y="3130940"/>
-          <a:ext cx="4572000" cy="3004584"/>
+          <a:ext cx="4572000" cy="3034204"/>
         </p:xfrm>
         <a:graphic>
           <a:graphicData uri="http://schemas.openxmlformats.org/drawingml/2006/table">
@@ -6146,7 +6202,7 @@
           <p:nvPr>
             <p:extLst>
               <p:ext uri="{D42A27DB-BD31-4B8C-83A1-F6EECF244321}">
-                <p14:modId xmlns:p14="http://schemas.microsoft.com/office/powerpoint/2010/main" val="1309778622"/>
+                <p14:modId xmlns:p14="http://schemas.microsoft.com/office/powerpoint/2010/main" val="1154429699"/>
               </p:ext>
             </p:extLst>
           </p:nvPr>
@@ -7858,7 +7914,9 @@
                       <a:tailEnd type="none" w="med" len="med"/>
                     </a:lnT>
                     <a:lnB w="12700" cap="flat" cmpd="sng" algn="ctr">
-                      <a:noFill/>
+                      <a:solidFill>
+                        <a:schemeClr val="tx1"/>
+                      </a:solidFill>
                       <a:prstDash val="solid"/>
                       <a:round/>
                       <a:headEnd type="none" w="med" len="med"/>
@@ -7911,7 +7969,9 @@
                       <a:tailEnd type="none" w="med" len="med"/>
                     </a:lnT>
                     <a:lnB w="12700" cap="flat" cmpd="sng" algn="ctr">
-                      <a:noFill/>
+                      <a:solidFill>
+                        <a:schemeClr val="tx1"/>
+                      </a:solidFill>
                       <a:prstDash val="solid"/>
                       <a:round/>
                       <a:headEnd type="none" w="med" len="med"/>
@@ -7973,7 +8033,9 @@
                       <a:tailEnd type="none" w="med" len="med"/>
                     </a:lnT>
                     <a:lnB w="12700" cap="flat" cmpd="sng" algn="ctr">
-                      <a:noFill/>
+                      <a:solidFill>
+                        <a:schemeClr val="tx1"/>
+                      </a:solidFill>
                       <a:prstDash val="solid"/>
                       <a:round/>
                       <a:headEnd type="none" w="med" len="med"/>
@@ -8052,7 +8114,7 @@
         </p:blipFill>
         <p:spPr>
           <a:xfrm>
-            <a:off x="4167551" y="1887680"/>
+            <a:off x="4167551" y="1795664"/>
             <a:ext cx="1949700" cy="321165"/>
           </a:xfrm>
           <a:prstGeom prst="rect">
@@ -8082,7 +8144,7 @@
         </p:blipFill>
         <p:spPr>
           <a:xfrm>
-            <a:off x="4752905" y="2161852"/>
+            <a:off x="4752905" y="2115844"/>
             <a:ext cx="1459016" cy="259233"/>
           </a:xfrm>
           <a:prstGeom prst="rect">
@@ -8464,6 +8526,147 @@
           </a:prstGeom>
         </p:spPr>
       </p:pic>
+      <p:pic>
+        <p:nvPicPr>
+          <p:cNvPr id="1026" name="Picture 2" descr="Read Rectangular Text Data • readr">
+            <a:extLst>
+              <a:ext uri="{FF2B5EF4-FFF2-40B4-BE49-F238E27FC236}">
+                <a16:creationId xmlns:a16="http://schemas.microsoft.com/office/drawing/2014/main" id="{7A7BC1B0-E84F-A8A1-76ED-65AC9734F75C}"/>
+              </a:ext>
+            </a:extLst>
+          </p:cNvPr>
+          <p:cNvPicPr>
+            <a:picLocks noChangeAspect="1" noChangeArrowheads="1"/>
+          </p:cNvPicPr>
+          <p:nvPr/>
+        </p:nvPicPr>
+        <p:blipFill>
+          <a:blip r:embed="rId15">
+            <a:extLst>
+              <a:ext uri="{28A0092B-C50C-407E-A947-70E740481C1C}">
+                <a14:useLocalDpi xmlns:a14="http://schemas.microsoft.com/office/drawing/2010/main" val="0"/>
+              </a:ext>
+            </a:extLst>
+          </a:blip>
+          <a:srcRect/>
+          <a:stretch>
+            <a:fillRect/>
+          </a:stretch>
+        </p:blipFill>
+        <p:spPr bwMode="auto">
+          <a:xfrm>
+            <a:off x="2179589" y="7490190"/>
+            <a:ext cx="399778" cy="460986"/>
+          </a:xfrm>
+          <a:prstGeom prst="rect">
+            <a:avLst/>
+          </a:prstGeom>
+          <a:noFill/>
+          <a:extLst>
+            <a:ext uri="{909E8E84-426E-40DD-AFC4-6F175D3DCCD1}">
+              <a14:hiddenFill xmlns:a14="http://schemas.microsoft.com/office/drawing/2010/main">
+                <a:solidFill>
+                  <a:srgbClr val="FFFFFF"/>
+                </a:solidFill>
+              </a14:hiddenFill>
+            </a:ext>
+          </a:extLst>
+        </p:spPr>
+      </p:pic>
+      <p:pic>
+        <p:nvPicPr>
+          <p:cNvPr id="1030" name="Picture 6" descr="dplyr - Wikipedia">
+            <a:extLst>
+              <a:ext uri="{FF2B5EF4-FFF2-40B4-BE49-F238E27FC236}">
+                <a16:creationId xmlns:a16="http://schemas.microsoft.com/office/drawing/2014/main" id="{F2E5D693-D79B-445E-11A6-500DB6EAE438}"/>
+              </a:ext>
+            </a:extLst>
+          </p:cNvPr>
+          <p:cNvPicPr>
+            <a:picLocks noChangeAspect="1" noChangeArrowheads="1"/>
+          </p:cNvPicPr>
+          <p:nvPr/>
+        </p:nvPicPr>
+        <p:blipFill>
+          <a:blip r:embed="rId16">
+            <a:extLst>
+              <a:ext uri="{28A0092B-C50C-407E-A947-70E740481C1C}">
+                <a14:useLocalDpi xmlns:a14="http://schemas.microsoft.com/office/drawing/2010/main" val="0"/>
+              </a:ext>
+            </a:extLst>
+          </a:blip>
+          <a:srcRect/>
+          <a:stretch>
+            <a:fillRect/>
+          </a:stretch>
+        </p:blipFill>
+        <p:spPr bwMode="auto">
+          <a:xfrm>
+            <a:off x="3040577" y="7490190"/>
+            <a:ext cx="399778" cy="460986"/>
+          </a:xfrm>
+          <a:prstGeom prst="rect">
+            <a:avLst/>
+          </a:prstGeom>
+          <a:noFill/>
+          <a:extLst>
+            <a:ext uri="{909E8E84-426E-40DD-AFC4-6F175D3DCCD1}">
+              <a14:hiddenFill xmlns:a14="http://schemas.microsoft.com/office/drawing/2010/main">
+                <a:solidFill>
+                  <a:srgbClr val="FFFFFF"/>
+                </a:solidFill>
+              </a14:hiddenFill>
+            </a:ext>
+          </a:extLst>
+        </p:spPr>
+      </p:pic>
+      <p:pic>
+        <p:nvPicPr>
+          <p:cNvPr id="1032" name="Picture 8" descr="Tidy Messy Data • tidyr">
+            <a:extLst>
+              <a:ext uri="{FF2B5EF4-FFF2-40B4-BE49-F238E27FC236}">
+                <a16:creationId xmlns:a16="http://schemas.microsoft.com/office/drawing/2014/main" id="{7DA8407C-5666-E961-23F5-EC260F979EFF}"/>
+              </a:ext>
+            </a:extLst>
+          </p:cNvPr>
+          <p:cNvPicPr>
+            <a:picLocks noChangeAspect="1" noChangeArrowheads="1"/>
+          </p:cNvPicPr>
+          <p:nvPr/>
+        </p:nvPicPr>
+        <p:blipFill>
+          <a:blip r:embed="rId17">
+            <a:extLst>
+              <a:ext uri="{28A0092B-C50C-407E-A947-70E740481C1C}">
+                <a14:useLocalDpi xmlns:a14="http://schemas.microsoft.com/office/drawing/2010/main" val="0"/>
+              </a:ext>
+            </a:extLst>
+          </a:blip>
+          <a:srcRect/>
+          <a:stretch>
+            <a:fillRect/>
+          </a:stretch>
+        </p:blipFill>
+        <p:spPr bwMode="auto">
+          <a:xfrm>
+            <a:off x="3901419" y="7490190"/>
+            <a:ext cx="399412" cy="460986"/>
+          </a:xfrm>
+          <a:prstGeom prst="rect">
+            <a:avLst/>
+          </a:prstGeom>
+          <a:noFill/>
+          <a:extLst>
+            <a:ext uri="{909E8E84-426E-40DD-AFC4-6F175D3DCCD1}">
+              <a14:hiddenFill xmlns:a14="http://schemas.microsoft.com/office/drawing/2010/main">
+                <a:solidFill>
+                  <a:srgbClr val="FFFFFF"/>
+                </a:solidFill>
+              </a14:hiddenFill>
+            </a:ext>
+          </a:extLst>
+        </p:spPr>
+      </p:pic>
     </p:spTree>
     <p:extLst>
       <p:ext uri="{BB962C8B-B14F-4D97-AF65-F5344CB8AC3E}">

</xml_diff>